<commit_message>
added binder link to slides
</commit_message>
<xml_diff>
--- a/slides/modelling-tutorial-senior-leaders-ppt.pptx
+++ b/slides/modelling-tutorial-senior-leaders-ppt.pptx
@@ -5,7 +5,7 @@
     <p:sldMasterId id="2147483648" r:id="rId1"/>
   </p:sldMasterIdLst>
   <p:notesMasterIdLst>
-    <p:notesMasterId r:id="rId17"/>
+    <p:notesMasterId r:id="rId21"/>
   </p:notesMasterIdLst>
   <p:sldIdLst>
     <p:sldId id="256" r:id="rId2"/>
@@ -23,6 +23,10 @@
     <p:sldId id="268" r:id="rId14"/>
     <p:sldId id="269" r:id="rId15"/>
     <p:sldId id="270" r:id="rId16"/>
+    <p:sldId id="271" r:id="rId17"/>
+    <p:sldId id="272" r:id="rId18"/>
+    <p:sldId id="273" r:id="rId19"/>
+    <p:sldId id="274" r:id="rId20"/>
   </p:sldIdLst>
   <p:sldSz cx="9144000" cy="5143500" type="screen16x9"/>
   <p:notesSz cx="6858000" cy="9144000"/>
@@ -536,7 +540,19 @@
             <a:pPr lvl="0"/>
             <a:r>
               <a:rPr/>
-              <a:t>Purpose of today is too help you understand how we would approach and applied data science problem</a:t>
+              <a:t>Purpose of today is to help you understand what is practically involved in solving a problem with AI, and give you a high level overview of the practical steps your team might be going through</a:t>
+            </a:r>
+          </a:p>
+          <a:p>
+            <a:pPr lvl="0" indent="0" marL="0">
+              <a:buNone/>
+            </a:pPr>
+          </a:p>
+          <a:p>
+            <a:pPr lvl="0"/>
+            <a:r>
+              <a:rPr b="1"/>
+              <a:t>run through list now </a:t>
             </a:r>
           </a:p>
           <a:p>
@@ -675,6 +691,18 @@
           <a:p>
             <a:pPr lvl="0"/>
             <a:r>
+              <a:rPr b="1"/>
+              <a:t>Reveal the code now</a:t>
+            </a:r>
+          </a:p>
+          <a:p>
+            <a:pPr lvl="0" indent="0" marL="0">
+              <a:buNone/>
+            </a:pPr>
+          </a:p>
+          <a:p>
+            <a:pPr lvl="0"/>
+            <a:r>
               <a:rPr/>
               <a:t>Notice how similar your code is - but instead of summarising, we ask it to predict.</a:t>
             </a:r>
@@ -792,7 +820,7 @@
             <a:pPr lvl="0"/>
             <a:r>
               <a:rPr/>
-              <a:t>So, here is a random sample of our predictions - you should have something broadly similar</a:t>
+              <a:t>So, here is a random sample of our predictions</a:t>
             </a:r>
           </a:p>
           <a:p>
@@ -804,7 +832,11 @@
             <a:pPr lvl="0"/>
             <a:r>
               <a:rPr/>
-              <a:t>5 random participants</a:t>
+              <a:t>5 random participants - </a:t>
+            </a:r>
+            <a:r>
+              <a:rPr i="1"/>
+              <a:t>we’ve now got predictions!</a:t>
             </a:r>
           </a:p>
         </p:txBody>
@@ -932,6 +964,18 @@
             <a:pPr lvl="0"/>
             <a:r>
               <a:rPr/>
+              <a:t>What you have done today is no differnet to what data scientists in your departments are doing everyday (or fancy consultants)</a:t>
+            </a:r>
+          </a:p>
+          <a:p>
+            <a:pPr lvl="0" indent="0" marL="0">
+              <a:buNone/>
+            </a:pPr>
+          </a:p>
+          <a:p>
+            <a:pPr lvl="0"/>
+            <a:r>
+              <a:rPr/>
               <a:t>Those predictions might appear simple, and the model simple, but the intuition and principles, from here to AI, are based on two differences</a:t>
             </a:r>
           </a:p>
@@ -1152,7 +1196,7 @@
             <a:pPr lvl="0"/>
             <a:r>
               <a:rPr/>
-              <a:t>Bring to a close</a:t>
+              <a:t>To illustrate that, here is a dataset, where people predict handwritten numbers…</a:t>
             </a:r>
           </a:p>
           <a:p>
@@ -1164,19 +1208,7 @@
             <a:pPr lvl="0"/>
             <a:r>
               <a:rPr/>
-              <a:t>By giving your staff the chance to learn explore, you build the foundations for AI</a:t>
-            </a:r>
-          </a:p>
-          <a:p>
-            <a:pPr lvl="0" indent="0" marL="0">
-              <a:buNone/>
-            </a:pPr>
-          </a:p>
-          <a:p>
-            <a:pPr lvl="0"/>
-            <a:r>
-              <a:rPr/>
-              <a:t>We’re keen to help - reach out with any questions, and support your staff to take part in Evidence House</a:t>
+              <a:t>For example, whether something is the number two</a:t>
             </a:r>
           </a:p>
         </p:txBody>
@@ -1198,7 +1230,203 @@
           <a:p>
             <a:fld id="{18BDFEC3-8487-43E8-A154-7C12CBC1FFF2}" type="slidenum">
               <a:rPr lang="en-US"/>
-              <a:t>15</a:t>
+              <a:t>16</a:t>
+            </a:fld>
+            <a:endParaRPr lang="en-US"/>
+          </a:p>
+        </p:txBody>
+      </p:sp>
+    </p:spTree>
+  </p:cSld>
+</p:notes>
+</file>
+
+<file path=ppt/notesSlides/notesSlide15.xml><?xml version="1.0" encoding="utf-8"?>
+<p:notes xmlns:a="http://schemas.openxmlformats.org/drawingml/2006/main" xmlns:r="http://schemas.openxmlformats.org/officeDocument/2006/relationships" xmlns:p="http://schemas.openxmlformats.org/presentationml/2006/main">
+  <p:cSld>
+    <p:spTree>
+      <p:nvGrpSpPr>
+        <p:cNvPr id="1" name=""/>
+        <p:cNvGrpSpPr/>
+        <p:nvPr/>
+      </p:nvGrpSpPr>
+      <p:grpSpPr>
+        <a:xfrm>
+          <a:off x="0" y="0"/>
+          <a:ext cx="0" cy="0"/>
+          <a:chOff x="0" y="0"/>
+          <a:chExt cx="0" cy="0"/>
+        </a:xfrm>
+      </p:grpSpPr>
+      <p:sp>
+        <p:nvSpPr>
+          <p:cNvPr id="2" name="Slide Image Placeholder 1"/>
+          <p:cNvSpPr>
+            <a:spLocks noGrp="1" noRot="1" noChangeAspect="1"/>
+          </p:cNvSpPr>
+          <p:nvPr>
+            <p:ph type="sldImg"/>
+          </p:nvPr>
+        </p:nvSpPr>
+        <p:spPr/>
+      </p:sp>
+      <p:sp>
+        <p:nvSpPr>
+          <p:cNvPr id="3" name="Notes Placeholder 2"/>
+          <p:cNvSpPr>
+            <a:spLocks noGrp="1"/>
+          </p:cNvSpPr>
+          <p:nvPr>
+            <p:ph type="body" idx="1"/>
+          </p:nvPr>
+        </p:nvSpPr>
+        <p:spPr/>
+        <p:txBody>
+          <a:bodyPr/>
+          <a:lstStyle/>
+          <a:p>
+            <a:pPr lvl="0"/>
+            <a:r>
+              <a:rPr/>
+              <a:t>Today, you’ve made predictions on 270 rows of data, between 0 and 1</a:t>
+            </a:r>
+          </a:p>
+          <a:p>
+            <a:pPr lvl="0" indent="0" marL="0">
+              <a:buNone/>
+            </a:pPr>
+          </a:p>
+          <a:p>
+            <a:pPr lvl="0"/>
+            <a:r>
+              <a:rPr/>
+              <a:t>All this two is is 170 rows of data, between 0 and 256, representing how dark pixels are</a:t>
+            </a:r>
+          </a:p>
+        </p:txBody>
+      </p:sp>
+      <p:sp>
+        <p:nvSpPr>
+          <p:cNvPr id="4" name="Slide Number Placeholder 3"/>
+          <p:cNvSpPr>
+            <a:spLocks noGrp="1"/>
+          </p:cNvSpPr>
+          <p:nvPr>
+            <p:ph type="sldNum" sz="quarter" idx="10"/>
+          </p:nvPr>
+        </p:nvSpPr>
+        <p:spPr/>
+        <p:txBody>
+          <a:bodyPr/>
+          <a:lstStyle/>
+          <a:p>
+            <a:fld id="{18BDFEC3-8487-43E8-A154-7C12CBC1FFF2}" type="slidenum">
+              <a:rPr lang="en-US"/>
+              <a:t>18</a:t>
+            </a:fld>
+            <a:endParaRPr lang="en-US"/>
+          </a:p>
+        </p:txBody>
+      </p:sp>
+    </p:spTree>
+  </p:cSld>
+</p:notes>
+</file>
+
+<file path=ppt/notesSlides/notesSlide16.xml><?xml version="1.0" encoding="utf-8"?>
+<p:notes xmlns:a="http://schemas.openxmlformats.org/drawingml/2006/main" xmlns:r="http://schemas.openxmlformats.org/officeDocument/2006/relationships" xmlns:p="http://schemas.openxmlformats.org/presentationml/2006/main">
+  <p:cSld>
+    <p:spTree>
+      <p:nvGrpSpPr>
+        <p:cNvPr id="1" name=""/>
+        <p:cNvGrpSpPr/>
+        <p:nvPr/>
+      </p:nvGrpSpPr>
+      <p:grpSpPr>
+        <a:xfrm>
+          <a:off x="0" y="0"/>
+          <a:ext cx="0" cy="0"/>
+          <a:chOff x="0" y="0"/>
+          <a:chExt cx="0" cy="0"/>
+        </a:xfrm>
+      </p:grpSpPr>
+      <p:sp>
+        <p:nvSpPr>
+          <p:cNvPr id="2" name="Slide Image Placeholder 1"/>
+          <p:cNvSpPr>
+            <a:spLocks noGrp="1" noRot="1" noChangeAspect="1"/>
+          </p:cNvSpPr>
+          <p:nvPr>
+            <p:ph type="sldImg"/>
+          </p:nvPr>
+        </p:nvSpPr>
+        <p:spPr/>
+      </p:sp>
+      <p:sp>
+        <p:nvSpPr>
+          <p:cNvPr id="3" name="Notes Placeholder 2"/>
+          <p:cNvSpPr>
+            <a:spLocks noGrp="1"/>
+          </p:cNvSpPr>
+          <p:nvPr>
+            <p:ph type="body" idx="1"/>
+          </p:nvPr>
+        </p:nvSpPr>
+        <p:spPr/>
+        <p:txBody>
+          <a:bodyPr/>
+          <a:lstStyle/>
+          <a:p>
+            <a:pPr lvl="0"/>
+            <a:r>
+              <a:rPr/>
+              <a:t>Bring to a close</a:t>
+            </a:r>
+          </a:p>
+          <a:p>
+            <a:pPr lvl="0" indent="0" marL="0">
+              <a:buNone/>
+            </a:pPr>
+          </a:p>
+          <a:p>
+            <a:pPr lvl="0"/>
+            <a:r>
+              <a:rPr/>
+              <a:t>By giving your staff the chance to learn explore, you build the foundations for AI</a:t>
+            </a:r>
+          </a:p>
+          <a:p>
+            <a:pPr lvl="0" indent="0" marL="0">
+              <a:buNone/>
+            </a:pPr>
+          </a:p>
+          <a:p>
+            <a:pPr lvl="0"/>
+            <a:r>
+              <a:rPr/>
+              <a:t>We’re keen to help - reach out with any questions, and support your staff to take part in Evidence House</a:t>
+            </a:r>
+          </a:p>
+        </p:txBody>
+      </p:sp>
+      <p:sp>
+        <p:nvSpPr>
+          <p:cNvPr id="4" name="Slide Number Placeholder 3"/>
+          <p:cNvSpPr>
+            <a:spLocks noGrp="1"/>
+          </p:cNvSpPr>
+          <p:nvPr>
+            <p:ph type="sldNum" sz="quarter" idx="10"/>
+          </p:nvPr>
+        </p:nvSpPr>
+        <p:spPr/>
+        <p:txBody>
+          <a:bodyPr/>
+          <a:lstStyle/>
+          <a:p>
+            <a:fld id="{18BDFEC3-8487-43E8-A154-7C12CBC1FFF2}" type="slidenum">
+              <a:rPr lang="en-US"/>
+              <a:t>19</a:t>
             </a:fld>
             <a:endParaRPr lang="en-US"/>
           </a:p>
@@ -1256,7 +1484,7 @@
             <a:pPr lvl="0"/>
             <a:r>
               <a:rPr/>
-              <a:t>So, the dataset we’ll be exploring today is a fake dataset of benefit claimants, over the 12 months.</a:t>
+              <a:t>run through slide</a:t>
             </a:r>
           </a:p>
           <a:p>
@@ -1268,7 +1496,31 @@
             <a:pPr lvl="0"/>
             <a:r>
               <a:rPr/>
-              <a:t>We have 90% of the dataset where we know whether or not they commited fraud… and 10% where we don’t.</a:t>
+              <a:t>This is a fake dataset, but the method will be similar to problems you’re all familiar with, for example:</a:t>
+            </a:r>
+          </a:p>
+          <a:p>
+            <a:pPr lvl="0" indent="0" marL="0">
+              <a:buNone/>
+            </a:pPr>
+          </a:p>
+          <a:p>
+            <a:pPr lvl="1"/>
+            <a:r>
+              <a:rPr/>
+              <a:t>Will pupils sucesfully graduate?</a:t>
+            </a:r>
+          </a:p>
+          <a:p>
+            <a:pPr lvl="0" indent="0" marL="0">
+              <a:buNone/>
+            </a:pPr>
+          </a:p>
+          <a:p>
+            <a:pPr lvl="1"/>
+            <a:r>
+              <a:rPr/>
+              <a:t>Will prisoners re-offend?</a:t>
             </a:r>
           </a:p>
           <a:p>
@@ -1407,6 +1659,18 @@
           <a:p>
             <a:pPr lvl="0"/>
             <a:r>
+              <a:rPr i="1"/>
+              <a:t>start with slides run through</a:t>
+            </a:r>
+          </a:p>
+          <a:p>
+            <a:pPr lvl="0" indent="0" marL="0">
+              <a:buNone/>
+            </a:pPr>
+          </a:p>
+          <a:p>
+            <a:pPr lvl="0"/>
+            <a:r>
               <a:rPr/>
               <a:t>Remember what we’re trying to achieve here: understanding how different parts of our data </a:t>
             </a:r>
@@ -1759,8 +2023,8 @@
           <a:p>
             <a:pPr lvl="0"/>
             <a:r>
-              <a:rPr/>
-              <a:t>You’re going to open your notebooks, and follow the instructions until you reach our first checkpoint</a:t>
+              <a:rPr b="1"/>
+              <a:t>You’re going to open your notebooks, and follow the instructions until you reach our first Practical 2 - Regression</a:t>
             </a:r>
           </a:p>
           <a:p>
@@ -1867,6 +2131,18 @@
           <a:p>
             <a:pPr lvl="0"/>
             <a:r>
+              <a:rPr b="1"/>
+              <a:t>First we’ll walk through it via slides, so don’t start yet.</a:t>
+            </a:r>
+          </a:p>
+          <a:p>
+            <a:pPr lvl="0" indent="0" marL="0">
+              <a:buNone/>
+            </a:pPr>
+          </a:p>
+          <a:p>
+            <a:pPr lvl="0"/>
+            <a:r>
               <a:rPr/>
               <a:t>Explain that we have three steps:</a:t>
             </a:r>
@@ -1931,16 +2207,8 @@
           <a:p>
             <a:pPr lvl="0"/>
             <a:r>
-              <a:rPr/>
-              <a:t>It’s going to produce quite a complicated box, but don’t worry about most of it now - instead, focus on the top right, on our </a:t>
-            </a:r>
-            <a:r>
-              <a:rPr i="1"/>
-              <a:t>r-squared</a:t>
-            </a:r>
-            <a:r>
-              <a:rPr/>
-              <a:t> value. It’s a key measure.</a:t>
+              <a:rPr b="1"/>
+              <a:t>Python will provide you with a range of values, but won’t worry too much about them for now - for now, we’ll focus on only one, the R-Squared</a:t>
             </a:r>
           </a:p>
         </p:txBody>
@@ -2032,7 +2300,7 @@
             <a:pPr lvl="0"/>
             <a:r>
               <a:rPr/>
-              <a:t>So why is this important? A model that fits our data is the mark of a good model!</a:t>
+              <a:t>So why is this important? Because your data should represent the real world, and a model that fits the real world, is the mark of a good model!</a:t>
             </a:r>
           </a:p>
           <a:p>
@@ -2044,7 +2312,7 @@
             <a:pPr lvl="0"/>
             <a:r>
               <a:rPr/>
-              <a:t>In the real world, there are concerns around simply perfecting your fit - for example, over-fitting, which you’ll have heard previously - but for now, we’re focusing on improving our model</a:t>
+              <a:t>In the real world, there are concerns around simply perfecting your fit - Laura briefly discussed over-fitting, for example - but for now, we’re focusing on improving our model</a:t>
             </a:r>
           </a:p>
         </p:txBody>
@@ -2171,6 +2439,18 @@
               <a:t>And sure enough, if we were to make a model like this, we’d have a poor R-squared value</a:t>
             </a:r>
           </a:p>
+          <a:p>
+            <a:pPr lvl="0" indent="0" marL="0">
+              <a:buNone/>
+            </a:pPr>
+          </a:p>
+          <a:p>
+            <a:pPr lvl="0"/>
+            <a:r>
+              <a:rPr/>
+              <a:t>but…</a:t>
+            </a:r>
+          </a:p>
         </p:txBody>
       </p:sp>
       <p:sp>
@@ -2274,17 +2554,13 @@
               <a:rPr b="1"/>
               <a:t>Now, it’s turn to practise building your first regression!</a:t>
             </a:r>
-          </a:p>
-          <a:p>
-            <a:pPr lvl="0" indent="0" marL="0">
-              <a:buNone/>
-            </a:pPr>
-          </a:p>
-          <a:p>
-            <a:pPr lvl="0"/>
+            <a:r>
+              <a:rPr/>
+              <a:t> </a:t>
+            </a:r>
             <a:r>
               <a:rPr b="1"/>
-              <a:t>WAIT UNTIL PARTICIPANTS REACH MARKER 2. Prompt about how their r-squared changed</a:t>
+              <a:t>- Participants code until practical 3</a:t>
             </a:r>
           </a:p>
           <a:p>
@@ -5406,7 +5682,7 @@
               <a:rPr>
                 <a:latin typeface="Courier"/>
               </a:rPr>
-              <a:t>mod </a:t>
+              <a:t>model </a:t>
             </a:r>
             <a:r>
               <a:rPr>
@@ -5648,7 +5924,7 @@
               <a:rPr>
                 <a:latin typeface="Courier"/>
               </a:rPr>
-              <a:t>mod </a:t>
+              <a:t>model </a:t>
             </a:r>
             <a:r>
               <a:rPr>
@@ -5709,7 +5985,7 @@
               <a:rPr>
                 <a:latin typeface="Courier"/>
               </a:rPr>
-              <a:t>res </a:t>
+              <a:t>results </a:t>
             </a:r>
             <a:r>
               <a:rPr>
@@ -5724,7 +6000,7 @@
               <a:rPr>
                 <a:latin typeface="Courier"/>
               </a:rPr>
-              <a:t> mod.fit()</a:t>
+              <a:t> model.fit()</a:t>
             </a:r>
             <a:br/>
             <a:r>
@@ -5746,7 +6022,7 @@
               <a:rPr>
                 <a:latin typeface="Courier"/>
               </a:rPr>
-              <a:t> res.predict(test)</a:t>
+              <a:t> results.predict(test)</a:t>
             </a:r>
           </a:p>
         </p:txBody>
@@ -5904,121 +6180,8 @@
           <a:chExt cx="0" cy="0"/>
         </a:xfrm>
       </p:grpSpPr>
-      <p:sp>
-        <p:nvSpPr>
-          <p:cNvPr id="3" name="Content Placeholder 2"/>
-          <p:cNvSpPr>
-            <a:spLocks noGrp="1"/>
-          </p:cNvSpPr>
-          <p:nvPr>
-            <p:ph idx="1"/>
-          </p:nvPr>
-        </p:nvSpPr>
-        <p:spPr/>
-        <p:txBody>
-          <a:bodyPr/>
-          <a:lstStyle/>
-          <a:p>
-            <a:pPr lvl="0"/>
-            <a:r>
-              <a:rPr/>
-              <a:t>To help make a binary, </a:t>
-            </a:r>
-            <a:r>
-              <a:rPr i="1"/>
-              <a:t>yes or no</a:t>
-            </a:r>
-            <a:r>
-              <a:rPr/>
-              <a:t> prediction, let’s decide anybody over 0.5 is included… then see how we did!</a:t>
-            </a:r>
-          </a:p>
-        </p:txBody>
-      </p:sp>
     </p:spTree>
   </p:cSld>
-  <p:timing>
-    <p:tnLst>
-      <p:par>
-        <p:cTn id="1" dur="indefinite" restart="never" nodeType="tmRoot">
-          <p:childTnLst>
-            <p:seq concurrent="1" nextAc="seek">
-              <p:cTn id="2" dur="indefinite" nodeType="mainSeq">
-                <p:childTnLst>
-                  <p:par>
-                    <p:cTn id="3" fill="hold">
-                      <p:stCondLst>
-                        <p:cond delay="indefinite"/>
-                      </p:stCondLst>
-                      <p:childTnLst>
-                        <p:par>
-                          <p:cTn id="4" fill="hold">
-                            <p:stCondLst>
-                              <p:cond delay="0"/>
-                            </p:stCondLst>
-                            <p:childTnLst>
-                              <p:par>
-                                <p:cTn id="5" presetID="1" presetClass="entr" presetSubtype="0" fill="hold" grpId="0" nodeType="clickEffect">
-                                  <p:stCondLst>
-                                    <p:cond delay="0"/>
-                                  </p:stCondLst>
-                                  <p:childTnLst>
-                                    <p:set>
-                                      <p:cBhvr>
-                                        <p:cTn id="6" dur="1" fill="hold">
-                                          <p:stCondLst>
-                                            <p:cond delay="0"/>
-                                          </p:stCondLst>
-                                        </p:cTn>
-                                        <p:tgtEl>
-                                          <p:spTgt spid="3">
-                                            <p:txEl>
-                                              <p:pRg st="0" end="0"/>
-                                            </p:txEl>
-                                          </p:spTgt>
-                                        </p:tgtEl>
-                                        <p:attrNameLst>
-                                          <p:attrName>style.visibility</p:attrName>
-                                        </p:attrNameLst>
-                                      </p:cBhvr>
-                                      <p:to>
-                                        <p:strVal val="visible"/>
-                                      </p:to>
-                                    </p:set>
-                                  </p:childTnLst>
-                                </p:cTn>
-                              </p:par>
-                            </p:childTnLst>
-                          </p:cTn>
-                        </p:par>
-                      </p:childTnLst>
-                    </p:cTn>
-                  </p:par>
-                </p:childTnLst>
-              </p:cTn>
-              <p:prevCondLst>
-                <p:cond evt="onPrev" delay="0">
-                  <p:tgtEl>
-                    <p:sldTgt/>
-                  </p:tgtEl>
-                </p:cond>
-              </p:prevCondLst>
-              <p:nextCondLst>
-                <p:cond evt="onNext" delay="0">
-                  <p:tgtEl>
-                    <p:sldTgt/>
-                  </p:tgtEl>
-                </p:cond>
-              </p:nextCondLst>
-            </p:seq>
-          </p:childTnLst>
-        </p:cTn>
-      </p:par>
-    </p:tnLst>
-    <p:bldLst>
-      <p:bldP spid="3" grpId="0" uiExpand="1" build="p"/>
-    </p:bldLst>
-  </p:timing>
 </p:sld>
 </file>
 
@@ -6096,137 +6259,6 @@
       </p:sp>
     </p:spTree>
   </p:cSld>
-  <p:timing>
-    <p:tnLst>
-      <p:par>
-        <p:cTn id="1" dur="indefinite" restart="never" nodeType="tmRoot">
-          <p:childTnLst>
-            <p:seq concurrent="1" nextAc="seek">
-              <p:cTn id="2" dur="indefinite" nodeType="mainSeq">
-                <p:childTnLst>
-                  <p:par>
-                    <p:cTn id="3" fill="hold">
-                      <p:stCondLst>
-                        <p:cond delay="indefinite"/>
-                      </p:stCondLst>
-                      <p:childTnLst>
-                        <p:par>
-                          <p:cTn id="4" fill="hold">
-                            <p:stCondLst>
-                              <p:cond delay="0"/>
-                            </p:stCondLst>
-                            <p:childTnLst>
-                              <p:par>
-                                <p:cTn id="5" presetID="1" presetClass="entr" presetSubtype="0" fill="hold" grpId="0" nodeType="clickEffect">
-                                  <p:stCondLst>
-                                    <p:cond delay="0"/>
-                                  </p:stCondLst>
-                                  <p:childTnLst>
-                                    <p:set>
-                                      <p:cBhvr>
-                                        <p:cTn id="6" dur="1" fill="hold">
-                                          <p:stCondLst>
-                                            <p:cond delay="0"/>
-                                          </p:stCondLst>
-                                        </p:cTn>
-                                        <p:tgtEl>
-                                          <p:spTgt spid="3">
-                                            <p:txEl>
-                                              <p:pRg st="0" end="0"/>
-                                            </p:txEl>
-                                          </p:spTgt>
-                                        </p:tgtEl>
-                                        <p:attrNameLst>
-                                          <p:attrName>style.visibility</p:attrName>
-                                        </p:attrNameLst>
-                                      </p:cBhvr>
-                                      <p:to>
-                                        <p:strVal val="visible"/>
-                                      </p:to>
-                                    </p:set>
-                                  </p:childTnLst>
-                                </p:cTn>
-                              </p:par>
-                            </p:childTnLst>
-                          </p:cTn>
-                        </p:par>
-                      </p:childTnLst>
-                    </p:cTn>
-                  </p:par>
-                  <p:par>
-                    <p:cTn id="7" fill="hold">
-                      <p:stCondLst>
-                        <p:cond delay="indefinite"/>
-                      </p:stCondLst>
-                      <p:childTnLst>
-                        <p:par>
-                          <p:cTn id="8" fill="hold">
-                            <p:stCondLst>
-                              <p:cond delay="0"/>
-                            </p:stCondLst>
-                            <p:childTnLst>
-                              <p:par>
-                                <p:cTn id="9" presetID="1" presetClass="entr" presetSubtype="0" fill="hold" grpId="0" nodeType="clickEffect">
-                                  <p:stCondLst>
-                                    <p:cond delay="0"/>
-                                  </p:stCondLst>
-                                  <p:childTnLst>
-                                    <p:set>
-                                      <p:cBhvr>
-                                        <p:cTn id="10" dur="1" fill="hold">
-                                          <p:stCondLst>
-                                            <p:cond delay="0"/>
-                                          </p:stCondLst>
-                                        </p:cTn>
-                                        <p:tgtEl>
-                                          <p:spTgt spid="3">
-                                            <p:txEl>
-                                              <p:pRg st="1" end="1"/>
-                                            </p:txEl>
-                                          </p:spTgt>
-                                        </p:tgtEl>
-                                        <p:attrNameLst>
-                                          <p:attrName>style.visibility</p:attrName>
-                                        </p:attrNameLst>
-                                      </p:cBhvr>
-                                      <p:to>
-                                        <p:strVal val="visible"/>
-                                      </p:to>
-                                    </p:set>
-                                  </p:childTnLst>
-                                </p:cTn>
-                              </p:par>
-                            </p:childTnLst>
-                          </p:cTn>
-                        </p:par>
-                      </p:childTnLst>
-                    </p:cTn>
-                  </p:par>
-                </p:childTnLst>
-              </p:cTn>
-              <p:prevCondLst>
-                <p:cond evt="onPrev" delay="0">
-                  <p:tgtEl>
-                    <p:sldTgt/>
-                  </p:tgtEl>
-                </p:cond>
-              </p:prevCondLst>
-              <p:nextCondLst>
-                <p:cond evt="onNext" delay="0">
-                  <p:tgtEl>
-                    <p:sldTgt/>
-                  </p:tgtEl>
-                </p:cond>
-              </p:nextCondLst>
-            </p:seq>
-          </p:childTnLst>
-        </p:cTn>
-      </p:par>
-    </p:tnLst>
-    <p:bldLst>
-      <p:bldP spid="3" grpId="0" uiExpand="1" build="p"/>
-    </p:bldLst>
-  </p:timing>
 </p:sld>
 </file>
 
@@ -6299,6 +6331,205 @@
           <a:chExt cx="0" cy="0"/>
         </a:xfrm>
       </p:grpSpPr>
+      <p:pic>
+        <p:nvPicPr>
+          <p:cNvPr descr="assets/mnist-1.png" id="0" name="Picture 1"/>
+          <p:cNvPicPr>
+            <a:picLocks noGrp="1" noChangeAspect="1"/>
+          </p:cNvPicPr>
+          <p:nvPr/>
+        </p:nvPicPr>
+        <p:blipFill>
+          <a:blip r:embed="rId2"/>
+          <a:stretch>
+            <a:fillRect/>
+          </a:stretch>
+        </p:blipFill>
+        <p:spPr bwMode="auto">
+          <a:xfrm>
+            <a:off x="2311400" y="1193800"/>
+            <a:ext cx="4521200" cy="3390900"/>
+          </a:xfrm>
+          <a:prstGeom prst="rect">
+            <a:avLst/>
+          </a:prstGeom>
+          <a:noFill/>
+          <a:ln w="9525">
+            <a:noFill/>
+            <a:headEnd/>
+            <a:tailEnd/>
+          </a:ln>
+        </p:spPr>
+      </p:pic>
+    </p:spTree>
+  </p:cSld>
+</p:sld>
+</file>
+
+<file path=ppt/slides/slide16.xml><?xml version="1.0" encoding="utf-8"?>
+<p:sld xmlns:a="http://schemas.openxmlformats.org/drawingml/2006/main" xmlns:r="http://schemas.openxmlformats.org/officeDocument/2006/relationships" xmlns:p="http://schemas.openxmlformats.org/presentationml/2006/main">
+  <p:cSld>
+    <p:spTree>
+      <p:nvGrpSpPr>
+        <p:cNvPr id="1" name=""/>
+        <p:cNvGrpSpPr/>
+        <p:nvPr/>
+      </p:nvGrpSpPr>
+      <p:grpSpPr>
+        <a:xfrm>
+          <a:off x="0" y="0"/>
+          <a:ext cx="0" cy="0"/>
+          <a:chOff x="0" y="0"/>
+          <a:chExt cx="0" cy="0"/>
+        </a:xfrm>
+      </p:grpSpPr>
+      <p:sp>
+        <p:nvSpPr>
+          <p:cNvPr id="3" name="Content Placeholder 2"/>
+          <p:cNvSpPr>
+            <a:spLocks noGrp="1"/>
+          </p:cNvSpPr>
+          <p:nvPr>
+            <p:ph idx="1"/>
+          </p:nvPr>
+        </p:nvSpPr>
+        <p:spPr/>
+        <p:txBody>
+          <a:bodyPr/>
+          <a:lstStyle/>
+          <a:p>
+            <a:pPr lvl="0" indent="0" marL="0">
+              <a:buNone/>
+            </a:pPr>
+          </a:p>
+        </p:txBody>
+      </p:sp>
+    </p:spTree>
+  </p:cSld>
+</p:sld>
+</file>
+
+<file path=ppt/slides/slide17.xml><?xml version="1.0" encoding="utf-8"?>
+<p:sld xmlns:a="http://schemas.openxmlformats.org/drawingml/2006/main" xmlns:r="http://schemas.openxmlformats.org/officeDocument/2006/relationships" xmlns:p="http://schemas.openxmlformats.org/presentationml/2006/main">
+  <p:cSld>
+    <p:spTree>
+      <p:nvGrpSpPr>
+        <p:cNvPr id="1" name=""/>
+        <p:cNvGrpSpPr/>
+        <p:nvPr/>
+      </p:nvGrpSpPr>
+      <p:grpSpPr>
+        <a:xfrm>
+          <a:off x="0" y="0"/>
+          <a:ext cx="0" cy="0"/>
+          <a:chOff x="0" y="0"/>
+          <a:chExt cx="0" cy="0"/>
+        </a:xfrm>
+      </p:grpSpPr>
+      <p:pic>
+        <p:nvPicPr>
+          <p:cNvPr descr="assets/mnist-2.png" id="0" name="Picture 1"/>
+          <p:cNvPicPr>
+            <a:picLocks noGrp="1" noChangeAspect="1"/>
+          </p:cNvPicPr>
+          <p:nvPr/>
+        </p:nvPicPr>
+        <p:blipFill>
+          <a:blip r:embed="rId2"/>
+          <a:stretch>
+            <a:fillRect/>
+          </a:stretch>
+        </p:blipFill>
+        <p:spPr bwMode="auto">
+          <a:xfrm>
+            <a:off x="2870200" y="1193800"/>
+            <a:ext cx="3390900" cy="3390900"/>
+          </a:xfrm>
+          <a:prstGeom prst="rect">
+            <a:avLst/>
+          </a:prstGeom>
+          <a:noFill/>
+          <a:ln w="9525">
+            <a:noFill/>
+            <a:headEnd/>
+            <a:tailEnd/>
+          </a:ln>
+        </p:spPr>
+      </p:pic>
+    </p:spTree>
+  </p:cSld>
+</p:sld>
+</file>
+
+<file path=ppt/slides/slide18.xml><?xml version="1.0" encoding="utf-8"?>
+<p:sld xmlns:a="http://schemas.openxmlformats.org/drawingml/2006/main" xmlns:r="http://schemas.openxmlformats.org/officeDocument/2006/relationships" xmlns:p="http://schemas.openxmlformats.org/presentationml/2006/main">
+  <p:cSld>
+    <p:spTree>
+      <p:nvGrpSpPr>
+        <p:cNvPr id="1" name=""/>
+        <p:cNvGrpSpPr/>
+        <p:nvPr/>
+      </p:nvGrpSpPr>
+      <p:grpSpPr>
+        <a:xfrm>
+          <a:off x="0" y="0"/>
+          <a:ext cx="0" cy="0"/>
+          <a:chOff x="0" y="0"/>
+          <a:chExt cx="0" cy="0"/>
+        </a:xfrm>
+      </p:grpSpPr>
+      <p:pic>
+        <p:nvPicPr>
+          <p:cNvPr descr="assets/mnist-3.png" id="0" name="Picture 1"/>
+          <p:cNvPicPr>
+            <a:picLocks noGrp="1" noChangeAspect="1"/>
+          </p:cNvPicPr>
+          <p:nvPr/>
+        </p:nvPicPr>
+        <p:blipFill>
+          <a:blip r:embed="rId3"/>
+          <a:stretch>
+            <a:fillRect/>
+          </a:stretch>
+        </p:blipFill>
+        <p:spPr bwMode="auto">
+          <a:xfrm>
+            <a:off x="2146300" y="1193800"/>
+            <a:ext cx="4851400" cy="3390900"/>
+          </a:xfrm>
+          <a:prstGeom prst="rect">
+            <a:avLst/>
+          </a:prstGeom>
+          <a:noFill/>
+          <a:ln w="9525">
+            <a:noFill/>
+            <a:headEnd/>
+            <a:tailEnd/>
+          </a:ln>
+        </p:spPr>
+      </p:pic>
+    </p:spTree>
+  </p:cSld>
+</p:sld>
+</file>
+
+<file path=ppt/slides/slide19.xml><?xml version="1.0" encoding="utf-8"?>
+<p:sld xmlns:a="http://schemas.openxmlformats.org/drawingml/2006/main" xmlns:r="http://schemas.openxmlformats.org/officeDocument/2006/relationships" xmlns:p="http://schemas.openxmlformats.org/presentationml/2006/main">
+  <p:cSld>
+    <p:spTree>
+      <p:nvGrpSpPr>
+        <p:cNvPr id="1" name=""/>
+        <p:cNvGrpSpPr/>
+        <p:nvPr/>
+      </p:nvGrpSpPr>
+      <p:grpSpPr>
+        <a:xfrm>
+          <a:off x="0" y="0"/>
+          <a:ext cx="0" cy="0"/>
+          <a:chOff x="0" y="0"/>
+          <a:chExt cx="0" cy="0"/>
+        </a:xfrm>
+      </p:grpSpPr>
       <p:sp>
         <p:nvSpPr>
           <p:cNvPr id="2" name="Title 1"/>
@@ -6488,6 +6719,17 @@
             <a:r>
               <a:rPr/>
               <a:t>Use our model to make predictions</a:t>
+            </a:r>
+          </a:p>
+          <a:p>
+            <a:pPr lvl="0"/>
+            <a:r>
+              <a:rPr/>
+              <a:t>Tutorial: </a:t>
+            </a:r>
+            <a:r>
+              <a:rPr b="1"/>
+              <a:t>bit.ly/ml-for-board</a:t>
             </a:r>
           </a:p>
         </p:txBody>
@@ -6747,6 +6989,55 @@
                       </p:childTnLst>
                     </p:cTn>
                   </p:par>
+                  <p:par>
+                    <p:cTn id="23" fill="hold">
+                      <p:stCondLst>
+                        <p:cond delay="indefinite"/>
+                      </p:stCondLst>
+                      <p:childTnLst>
+                        <p:par>
+                          <p:cTn id="24" fill="hold">
+                            <p:stCondLst>
+                              <p:cond delay="0"/>
+                            </p:stCondLst>
+                            <p:childTnLst>
+                              <p:par>
+                                <p:cTn id="25" presetID="1" presetClass="entr" presetSubtype="0" fill="hold" grpId="0" nodeType="clickEffect">
+                                  <p:stCondLst>
+                                    <p:cond delay="0"/>
+                                  </p:stCondLst>
+                                  <p:childTnLst>
+                                    <p:set>
+                                      <p:cBhvr>
+                                        <p:cTn id="26" dur="1" fill="hold">
+                                          <p:stCondLst>
+                                            <p:cond delay="0"/>
+                                          </p:stCondLst>
+                                        </p:cTn>
+                                        <p:tgtEl>
+                                          <p:spTgt spid="3">
+                                            <p:txEl>
+                                              <p:pRg st="5" end="5"/>
+                                            </p:txEl>
+                                          </p:spTgt>
+                                        </p:tgtEl>
+                                        <p:attrNameLst>
+                                          <p:attrName>style.visibility</p:attrName>
+                                        </p:attrNameLst>
+                                      </p:cBhvr>
+                                      <p:to>
+                                        <p:strVal val="visible"/>
+                                      </p:to>
+                                    </p:set>
+                                  </p:childTnLst>
+                                </p:cTn>
+                              </p:par>
+                            </p:childTnLst>
+                          </p:cTn>
+                        </p:par>
+                      </p:childTnLst>
+                    </p:cTn>
+                  </p:par>
                 </p:childTnLst>
               </p:cTn>
               <p:prevCondLst>
@@ -6835,14 +7126,14 @@
             <a:pPr lvl="0"/>
             <a:r>
               <a:rPr/>
-              <a:t>We’ve built a synthetic dataset of benefit claimants</a:t>
-            </a:r>
-          </a:p>
-          <a:p>
-            <a:pPr lvl="0"/>
-            <a:r>
-              <a:rPr/>
-              <a:t>Each row is a claimant over the past 12 months</a:t>
+              <a:t>We’ve built a fake dataset</a:t>
+            </a:r>
+          </a:p>
+          <a:p>
+            <a:pPr lvl="0"/>
+            <a:r>
+              <a:rPr/>
+              <a:t>Each row represents a benefit claimant, that has been suspected of fraud, over the last 12 months</a:t>
             </a:r>
           </a:p>
           <a:p>
@@ -6856,21 +7147,37 @@
             <a:pPr lvl="1"/>
             <a:r>
               <a:rPr/>
-              <a:t>a training dataset (270 individuals)</a:t>
+              <a:t>a </a:t>
+            </a:r>
+            <a:r>
+              <a:rPr i="1"/>
+              <a:t>training</a:t>
+            </a:r>
+            <a:r>
+              <a:rPr/>
+              <a:t> dataset (270 individuals) where a human has manually verified whether fraud was commited</a:t>
             </a:r>
           </a:p>
           <a:p>
             <a:pPr lvl="1"/>
             <a:r>
               <a:rPr/>
-              <a:t>a test dataset (30 indivuals)</a:t>
-            </a:r>
-          </a:p>
-          <a:p>
-            <a:pPr lvl="0"/>
-            <a:r>
-              <a:rPr/>
-              <a:t>Can we predict the behaviour of claimants in our test dataset?</a:t>
+              <a:t>a </a:t>
+            </a:r>
+            <a:r>
+              <a:rPr i="1"/>
+              <a:t>test</a:t>
+            </a:r>
+            <a:r>
+              <a:rPr/>
+              <a:t> dataset (30 indivuals) where we’ll aim to predict whether or not fraud was committed</a:t>
+            </a:r>
+          </a:p>
+          <a:p>
+            <a:pPr lvl="0"/>
+            <a:r>
+              <a:rPr b="1"/>
+              <a:t>Can we build a model to predict whether claimants have comitted fraud?</a:t>
             </a:r>
           </a:p>
         </p:txBody>
@@ -7285,7 +7592,7 @@
             <a:pPr lvl="0"/>
             <a:r>
               <a:rPr/>
-              <a:t>Correlation is a statisitcla measure of </a:t>
+              <a:t>Correlation is a statistical measure of </a:t>
             </a:r>
             <a:r>
               <a:rPr i="1"/>
@@ -7882,7 +8189,7 @@
               <a:rPr>
                 <a:latin typeface="Courier"/>
               </a:rPr>
-              <a:t>df[[</a:t>
+              <a:t>training[[</a:t>
             </a:r>
             <a:r>
               <a:rPr>
@@ -8131,7 +8438,7 @@
               <a:rPr>
                 <a:latin typeface="Courier"/>
               </a:rPr>
-              <a:t>mod </a:t>
+              <a:t>model </a:t>
             </a:r>
             <a:r>
               <a:rPr>
@@ -8185,14 +8492,14 @@
               <a:rPr>
                 <a:latin typeface="Courier"/>
               </a:rPr>
-              <a:t>df)</a:t>
+              <a:t>training)</a:t>
             </a:r>
             <a:br/>
             <a:r>
               <a:rPr>
                 <a:latin typeface="Courier"/>
               </a:rPr>
-              <a:t>res </a:t>
+              <a:t>results </a:t>
             </a:r>
             <a:r>
               <a:rPr>
@@ -8207,14 +8514,14 @@
               <a:rPr>
                 <a:latin typeface="Courier"/>
               </a:rPr>
-              <a:t> mod.fit()</a:t>
+              <a:t> model.fit()</a:t>
             </a:r>
             <a:br/>
             <a:r>
               <a:rPr>
                 <a:latin typeface="Courier"/>
               </a:rPr>
-              <a:t>res.summary()</a:t>
+              <a:t>results.summary()</a:t>
             </a:r>
           </a:p>
           <a:p>
@@ -8384,33 +8691,25 @@
             <a:pPr lvl="0"/>
             <a:r>
               <a:rPr/>
-              <a:t>I like thinking of it as </a:t>
+              <a:t>I like thinking of it as how “good” our model is, </a:t>
             </a:r>
             <a:r>
               <a:rPr i="1"/>
-              <a:t>how well our model fits</a:t>
-            </a:r>
-            <a:r>
-              <a:rPr/>
-              <a:t>, in percentage terms</a:t>
-            </a:r>
-          </a:p>
-          <a:p>
-            <a:pPr lvl="0"/>
-            <a:r>
-              <a:rPr/>
-              <a:t>So a model with a R-squared of 1 fits 100% of our data</a:t>
-            </a:r>
-          </a:p>
-          <a:p>
-            <a:pPr lvl="0"/>
-            <a:r>
-              <a:rPr/>
-              <a:t>…or like </a:t>
-            </a:r>
-            <a:r>
-              <a:rPr i="1"/>
-              <a:t>super correlation!</a:t>
+              <a:t>in percentage terms</a:t>
+            </a:r>
+          </a:p>
+          <a:p>
+            <a:pPr lvl="0"/>
+            <a:r>
+              <a:rPr/>
+              <a:t>So a model with a R-squared of 1.0 fits 100% of our data, while 0.5 would fit 50%</a:t>
+            </a:r>
+          </a:p>
+          <a:p>
+            <a:pPr lvl="0"/>
+            <a:r>
+              <a:rPr/>
+              <a:t>It’s a little like correlation…but with a lot more potential!</a:t>
             </a:r>
           </a:p>
         </p:txBody>
@@ -8713,7 +9012,7 @@
               <a:rPr>
                 <a:latin typeface="Courier"/>
               </a:rPr>
-              <a:t>mod </a:t>
+              <a:t>model </a:t>
             </a:r>
             <a:r>
               <a:rPr>

</xml_diff>